<commit_message>
Zwischenpräsentation zu 90% fertiggestellt
</commit_message>
<xml_diff>
--- a/Zwischenpräsentation.pptx
+++ b/Zwischenpräsentation.pptx
@@ -111,6 +111,11 @@
       </a:defRPr>
     </a:lvl9pPr>
   </p:defaultTextStyle>
+  <p:extLst>
+    <p:ext uri="{EFAFB233-063F-42B5-8137-9DF3F51BA10A}">
+      <p15:sldGuideLst xmlns:p15="http://schemas.microsoft.com/office/powerpoint/2012/main"/>
+    </p:ext>
+  </p:extLst>
 </p:presentation>
 </file>
 
@@ -7355,10 +7360,10 @@
           <a:lstStyle/>
           <a:p>
             <a:r>
-              <a:rPr lang="de-DE" dirty="0"/>
+              <a:rPr lang="de-DE" b="1" dirty="0"/>
               <a:t>Rückblick</a:t>
             </a:r>
-            <a:endParaRPr lang="de-AT" dirty="0"/>
+            <a:endParaRPr lang="de-AT" b="1" dirty="0"/>
           </a:p>
         </p:txBody>
       </p:sp>
@@ -7572,10 +7577,10 @@
           <a:lstStyle/>
           <a:p>
             <a:r>
-              <a:rPr lang="de-DE" dirty="0"/>
+              <a:rPr lang="de-DE" b="1" dirty="0"/>
               <a:t>Ziele</a:t>
             </a:r>
-            <a:endParaRPr lang="de-AT" dirty="0"/>
+            <a:endParaRPr lang="de-AT" b="1" dirty="0"/>
           </a:p>
         </p:txBody>
       </p:sp>
@@ -7808,10 +7813,10 @@
           <a:lstStyle/>
           <a:p>
             <a:r>
-              <a:rPr lang="de-DE" dirty="0"/>
+              <a:rPr lang="de-DE" b="1" dirty="0"/>
               <a:t>Sprint 2</a:t>
             </a:r>
-            <a:endParaRPr lang="de-AT" dirty="0"/>
+            <a:endParaRPr lang="de-AT" b="1" dirty="0"/>
           </a:p>
         </p:txBody>
       </p:sp>
@@ -7836,7 +7841,7 @@
           <a:bodyPr/>
           <a:lstStyle/>
           <a:p>
-            <a:endParaRPr lang="de-AT"/>
+            <a:endParaRPr lang="de-AT" dirty="0"/>
           </a:p>
         </p:txBody>
       </p:sp>
@@ -10513,14 +10518,7 @@
           <a:p>
             <a:pPr algn="ctr"/>
             <a:r>
-              <a:rPr lang="en-US" kern="1200">
-                <a:solidFill>
-                  <a:schemeClr val="tx1"/>
-                </a:solidFill>
-                <a:latin typeface="+mj-lt"/>
-                <a:ea typeface="+mj-ea"/>
-                <a:cs typeface="+mj-cs"/>
-              </a:rPr>
+              <a:rPr lang="en-US" b="1" dirty="0"/>
               <a:t>Live Demo</a:t>
             </a:r>
           </a:p>
@@ -10617,10 +10615,10 @@
           <a:lstStyle/>
           <a:p>
             <a:r>
-              <a:rPr lang="de-DE" dirty="0"/>
+              <a:rPr lang="de-DE" b="1" dirty="0"/>
               <a:t>Herausforderungen / Schwierigkeiten</a:t>
             </a:r>
-            <a:endParaRPr lang="de-AT" dirty="0"/>
+            <a:endParaRPr lang="de-AT" b="1" dirty="0"/>
           </a:p>
         </p:txBody>
       </p:sp>
@@ -10642,10 +10640,77 @@
         </p:nvSpPr>
         <p:spPr/>
         <p:txBody>
-          <a:bodyPr/>
+          <a:bodyPr>
+            <a:normAutofit/>
+          </a:bodyPr>
           <a:lstStyle/>
           <a:p>
-            <a:endParaRPr lang="de-AT" dirty="0"/>
+            <a:r>
+              <a:rPr lang="de-DE" sz="2400" dirty="0"/>
+              <a:t>Einarbeitung in </a:t>
+            </a:r>
+            <a:r>
+              <a:rPr lang="de-DE" sz="2400" b="1" dirty="0"/>
+              <a:t>Jira</a:t>
+            </a:r>
+            <a:r>
+              <a:rPr lang="de-DE" sz="2400" dirty="0"/>
+              <a:t> war anfangs ungewohnt – Aufteilung der Aufgaben und Sprintplanung mussten erst verstanden werden</a:t>
+            </a:r>
+          </a:p>
+          <a:p>
+            <a:r>
+              <a:rPr lang="de-DE" sz="2400" dirty="0"/>
+              <a:t>Die zunächst gewählte Kombination aus </a:t>
+            </a:r>
+            <a:r>
+              <a:rPr lang="de-DE" sz="2400" b="1" dirty="0"/>
+              <a:t>HTML und JavaScript </a:t>
+            </a:r>
+            <a:r>
+              <a:rPr lang="de-DE" sz="2400" dirty="0"/>
+              <a:t>war nicht </a:t>
+            </a:r>
+            <a:r>
+              <a:rPr lang="de-DE" sz="2400" b="1" dirty="0"/>
+              <a:t>durchdacht</a:t>
+            </a:r>
+            <a:r>
+              <a:rPr lang="de-DE" sz="2400" dirty="0"/>
+              <a:t> genug – führte zu Verständnisschwierigkeiten im Team</a:t>
+            </a:r>
+          </a:p>
+          <a:p>
+            <a:r>
+              <a:rPr lang="de-DE" sz="2400" dirty="0"/>
+              <a:t>Umstieg auf eine </a:t>
+            </a:r>
+            <a:r>
+              <a:rPr lang="de-DE" sz="2400" b="1" dirty="0"/>
+              <a:t>ASP.NET Web App</a:t>
+            </a:r>
+            <a:r>
+              <a:rPr lang="de-DE" sz="2400" dirty="0"/>
+              <a:t>, da wir damit strukturierter arbeiten können und die Funktionsweise </a:t>
+            </a:r>
+            <a:r>
+              <a:rPr lang="de-DE" sz="2400" b="1" dirty="0"/>
+              <a:t>besser verstehen</a:t>
+            </a:r>
+          </a:p>
+          <a:p>
+            <a:r>
+              <a:rPr lang="de-DE" sz="2400" dirty="0"/>
+              <a:t>Zeitverlust durch den </a:t>
+            </a:r>
+            <a:r>
+              <a:rPr lang="de-DE" sz="2400" b="1" dirty="0"/>
+              <a:t>Technologie-Wechsel</a:t>
+            </a:r>
+            <a:r>
+              <a:rPr lang="de-DE" sz="2400" dirty="0"/>
+              <a:t>, aber langfristig bessere Umsetzbarkeit</a:t>
+            </a:r>
           </a:p>
         </p:txBody>
       </p:sp>
@@ -10701,10 +10766,10 @@
           <a:lstStyle/>
           <a:p>
             <a:r>
-              <a:rPr lang="de-DE" dirty="0"/>
+              <a:rPr lang="de-DE" b="1" dirty="0"/>
               <a:t>Ausblick</a:t>
             </a:r>
-            <a:endParaRPr lang="de-AT" dirty="0"/>
+            <a:endParaRPr lang="de-AT" b="1" dirty="0"/>
           </a:p>
         </p:txBody>
       </p:sp>
@@ -10726,10 +10791,61 @@
         </p:nvSpPr>
         <p:spPr/>
         <p:txBody>
-          <a:bodyPr/>
+          <a:bodyPr>
+            <a:normAutofit/>
+          </a:bodyPr>
           <a:lstStyle/>
           <a:p>
-            <a:endParaRPr lang="de-AT"/>
+            <a:r>
+              <a:rPr lang="de-AT" dirty="0"/>
+              <a:t>Einrichtung der Datenbankverbindung</a:t>
+            </a:r>
+          </a:p>
+          <a:p>
+            <a:pPr lvl="1"/>
+            <a:r>
+              <a:rPr lang="de-AT" dirty="0"/>
+              <a:t>Verbindung zwischen ASP.NET Web App und z. B. SQL Server / Azure SQL</a:t>
+            </a:r>
+          </a:p>
+          <a:p>
+            <a:r>
+              <a:rPr lang="de-AT" dirty="0"/>
+              <a:t>Implementierung von Microsoft Login</a:t>
+            </a:r>
+          </a:p>
+          <a:p>
+            <a:pPr lvl="1"/>
+            <a:r>
+              <a:rPr lang="de-AT" dirty="0"/>
+              <a:t>Anmeldung über Microsoft-Schulaccounts (Azure AD / Microsoft Identity)</a:t>
+            </a:r>
+          </a:p>
+          <a:p>
+            <a:r>
+              <a:rPr lang="de-AT" dirty="0"/>
+              <a:t>Erstellung eines Admin-Accounts</a:t>
+            </a:r>
+          </a:p>
+          <a:p>
+            <a:pPr lvl="1"/>
+            <a:r>
+              <a:rPr lang="de-AT" dirty="0"/>
+              <a:t>Für Verwaltung, Anfragen-Freigabe und Rechtevergabe</a:t>
+            </a:r>
+          </a:p>
+          <a:p>
+            <a:r>
+              <a:rPr lang="de-AT" dirty="0"/>
+              <a:t>Benachrichtigungssystem bei Anfragen</a:t>
+            </a:r>
+          </a:p>
+          <a:p>
+            <a:pPr lvl="1"/>
+            <a:r>
+              <a:rPr lang="de-AT" dirty="0"/>
+              <a:t>E-Mail oder In-App-Benachrichtigungen bei Beitrittsanfragen zu Fahrten</a:t>
+            </a:r>
           </a:p>
         </p:txBody>
       </p:sp>

</xml_diff>

<commit_message>
Session eingeführt und User-Daten auf UserPage geladen
- Session in Program.cs aktiviert und korrekt positioniert (AddSession + UseSession)
- Bei Login und Registrierung wird UserId in der Session gespeichert
- UserPage lädt die eingeloggte Person über Session und zeigt Name & Coins an
- Name aus E-Mail-Adresse wird automatisch in Title Case umgewandelt (z. B. „gabriel.deiac@htlwy.at“ → „Gabriel Deiac“)
- Platzhalter auf UserPage.cshtml durch dynamische Razor-Ausgaben ersetzt
</commit_message>
<xml_diff>
--- a/Zwischenpräsentation.pptx
+++ b/Zwischenpräsentation.pptx
@@ -7607,17 +7607,19 @@
           </a:xfrm>
         </p:spPr>
         <p:txBody>
-          <a:bodyPr/>
+          <a:bodyPr>
+            <a:normAutofit/>
+          </a:bodyPr>
           <a:lstStyle/>
           <a:p>
             <a:pPr marL="0" indent="0">
               <a:buNone/>
             </a:pPr>
             <a:r>
-              <a:rPr lang="de-DE" sz="1400" b="1" dirty="0"/>
+              <a:rPr lang="de-DE" sz="1800" b="1" dirty="0"/>
               <a:t>Sprintziel </a:t>
             </a:r>
-            <a:endParaRPr lang="de-DE" sz="1400" dirty="0"/>
+            <a:endParaRPr lang="de-DE" sz="1800" dirty="0"/>
           </a:p>
           <a:p>
             <a:pPr>
@@ -7625,7 +7627,7 @@
               <a:buChar char="•"/>
             </a:pPr>
             <a:r>
-              <a:rPr lang="de-DE" sz="1050" dirty="0"/>
+              <a:rPr lang="de-DE" sz="1200" dirty="0"/>
               <a:t>Entwicklung eines funktionierenden Prototyps zur Anzeige und Auswahl verfügbarer Fahrten</a:t>
             </a:r>
           </a:p>
@@ -7635,7 +7637,7 @@
               <a:buChar char="•"/>
             </a:pPr>
             <a:r>
-              <a:rPr lang="de-DE" sz="1050" dirty="0"/>
+              <a:rPr lang="de-DE" sz="1200" dirty="0"/>
               <a:t>Nutzer sollen sich registrieren und anmelden können</a:t>
             </a:r>
           </a:p>
@@ -7645,7 +7647,7 @@
               <a:buChar char="•"/>
             </a:pPr>
             <a:r>
-              <a:rPr lang="de-DE" sz="1050" dirty="0"/>
+              <a:rPr lang="de-DE" sz="1200" dirty="0"/>
               <a:t>Fokus auf Fahrtenübersicht und erste Interaktionsmöglichkeiten</a:t>
             </a:r>
           </a:p>
@@ -7653,14 +7655,14 @@
             <a:pPr marL="0" indent="0">
               <a:buNone/>
             </a:pPr>
-            <a:endParaRPr lang="de-DE" sz="1050" dirty="0"/>
+            <a:endParaRPr lang="de-DE" sz="1200" dirty="0"/>
           </a:p>
           <a:p>
             <a:pPr marL="0" indent="0">
               <a:buNone/>
             </a:pPr>
             <a:r>
-              <a:rPr lang="de-DE" sz="1400" b="1" dirty="0"/>
+              <a:rPr lang="de-DE" sz="1800" b="1" dirty="0"/>
               <a:t>Wichtigste User Stories / Tasks</a:t>
             </a:r>
           </a:p>
@@ -7670,7 +7672,7 @@
               <a:buChar char="•"/>
             </a:pPr>
             <a:r>
-              <a:rPr lang="de-AT" sz="1050" dirty="0"/>
+              <a:rPr lang="de-AT" sz="1200" dirty="0"/>
               <a:t>Home Page </a:t>
             </a:r>
           </a:p>
@@ -7680,7 +7682,7 @@
               <a:buChar char="•"/>
             </a:pPr>
             <a:r>
-              <a:rPr lang="de-AT" sz="1050" dirty="0"/>
+              <a:rPr lang="de-AT" sz="1200" dirty="0"/>
               <a:t>Login- und Registrierungsseite</a:t>
             </a:r>
           </a:p>
@@ -7690,11 +7692,11 @@
               <a:buChar char="•"/>
             </a:pPr>
             <a:r>
-              <a:rPr lang="de-DE" sz="1050" dirty="0" err="1"/>
+              <a:rPr lang="de-DE" sz="1200" dirty="0" err="1"/>
               <a:t>Join</a:t>
             </a:r>
             <a:r>
-              <a:rPr lang="de-DE" sz="1050" dirty="0"/>
+              <a:rPr lang="de-DE" sz="1200" dirty="0"/>
               <a:t>- &amp; Create-Page zum Beitreten und Erstellen von Fahrten</a:t>
             </a:r>
           </a:p>
@@ -7704,7 +7706,7 @@
               <a:buChar char="•"/>
             </a:pPr>
             <a:r>
-              <a:rPr lang="de-DE" sz="1050" dirty="0"/>
+              <a:rPr lang="de-DE" sz="1200" dirty="0"/>
               <a:t>Edit-Page 1 &amp; 2 zur Bearbeitung eigener Fahrten</a:t>
             </a:r>
           </a:p>
@@ -7714,11 +7716,11 @@
               <a:buChar char="•"/>
             </a:pPr>
             <a:r>
-              <a:rPr lang="de-DE" sz="1050" dirty="0" err="1"/>
+              <a:rPr lang="de-DE" sz="1200" dirty="0" err="1"/>
               <a:t>Overview</a:t>
             </a:r>
             <a:r>
-              <a:rPr lang="de-DE" sz="1050" dirty="0"/>
+              <a:rPr lang="de-DE" sz="1200" dirty="0"/>
               <a:t>-Page zur Anzeige aller Möglichkeiten der App</a:t>
             </a:r>
           </a:p>
@@ -7728,7 +7730,7 @@
               <a:buChar char="•"/>
             </a:pPr>
             <a:r>
-              <a:rPr lang="de-DE" sz="1050" dirty="0"/>
+              <a:rPr lang="de-DE" sz="1200" dirty="0"/>
               <a:t>Profilseite zur Verwaltung persönlicher Daten</a:t>
             </a:r>
           </a:p>
@@ -7738,7 +7740,7 @@
               <a:buChar char="•"/>
             </a:pPr>
             <a:r>
-              <a:rPr lang="de-DE" sz="1050" dirty="0"/>
+              <a:rPr lang="de-DE" sz="1200" dirty="0"/>
               <a:t>„Meine Fahrten“-Seite mit Übersicht aller eigenen Fahrgemeinschaften</a:t>
             </a:r>
           </a:p>
@@ -7748,7 +7750,7 @@
               <a:buChar char="•"/>
             </a:pPr>
             <a:r>
-              <a:rPr lang="de-DE" sz="1050" dirty="0"/>
+              <a:rPr lang="de-DE" sz="1200" dirty="0"/>
               <a:t>Shop-Seite (optional) als Idee für spätere Erweiterung</a:t>
             </a:r>
           </a:p>
@@ -7757,7 +7759,7 @@
               <a:buFont typeface="Arial" panose="020B0604020202020204" pitchFamily="34" charset="0"/>
               <a:buChar char="•"/>
             </a:pPr>
-            <a:endParaRPr lang="de-DE" sz="1050" dirty="0"/>
+            <a:endParaRPr lang="de-DE" sz="1200" dirty="0"/>
           </a:p>
         </p:txBody>
       </p:sp>

</xml_diff>